<commit_message>
Added el translations for some pages
</commit_message>
<xml_diff>
--- a/_site/translations/el/beginner/Color.pptx
+++ b/_site/translations/el/beginner/Color.pptx
@@ -220,7 +220,7 @@
           <a:p>
             <a:fld id="{F8D9B3D7-15CB-9343-AA49-EFB5A8F33F18}" type="datetimeFigureOut">
               <a:rPr lang="en-US" smtClean="0"/>
-              <a:t>5/13/17</a:t>
+              <a:t>5/19/2017</a:t>
             </a:fld>
             <a:endParaRPr lang="en-US" dirty="0"/>
           </a:p>
@@ -386,7 +386,7 @@
           <a:p>
             <a:fld id="{FD3EFF1E-85A1-6640-AFB9-C38833E80A84}" type="datetimeFigureOut">
               <a:rPr lang="en-US" smtClean="0"/>
-              <a:t>5/13/17</a:t>
+              <a:t>5/19/2017</a:t>
             </a:fld>
             <a:endParaRPr lang="en-US" dirty="0"/>
           </a:p>
@@ -1059,7 +1059,7 @@
           <a:p>
             <a:fld id="{28601696-FB41-0746-AA2B-CE0B2F753BDC}" type="datetime1">
               <a:rPr lang="en-US" smtClean="0"/>
-              <a:t>5/13/17</a:t>
+              <a:t>5/19/2017</a:t>
             </a:fld>
             <a:endParaRPr lang="en-US" dirty="0"/>
           </a:p>
@@ -1278,7 +1278,7 @@
           <a:noFill/>
           <a:extLst>
             <a:ext uri="{909E8E84-426E-40dd-AFC4-6F175D3DCCD1}">
-              <a14:hiddenFill xmlns="" xmlns:a14="http://schemas.microsoft.com/office/drawing/2010/main">
+              <a14:hiddenFill xmlns:a14="http://schemas.microsoft.com/office/drawing/2010/main" xmlns="">
                 <a:solidFill>
                   <a:srgbClr val="FFFFFF"/>
                 </a:solidFill>
@@ -1596,7 +1596,7 @@
           <a:p>
             <a:fld id="{51C19D13-B9B5-614A-B09A-280D80FF0B3D}" type="datetime1">
               <a:rPr lang="en-US" smtClean="0"/>
-              <a:t>5/13/17</a:t>
+              <a:t>5/19/2017</a:t>
             </a:fld>
             <a:endParaRPr lang="en-US" dirty="0"/>
           </a:p>
@@ -1788,7 +1788,7 @@
           <a:p>
             <a:fld id="{F209E9F7-51E3-8845-B739-DCD11061DF60}" type="datetime1">
               <a:rPr lang="en-US" smtClean="0"/>
-              <a:t>5/13/17</a:t>
+              <a:t>5/19/2017</a:t>
             </a:fld>
             <a:endParaRPr lang="en-US" dirty="0"/>
           </a:p>
@@ -1992,7 +1992,7 @@
           <a:p>
             <a:fld id="{886592DE-E2EF-C94D-9CA8-A67428EF6983}" type="datetime1">
               <a:rPr lang="en-US" smtClean="0"/>
-              <a:t>5/13/17</a:t>
+              <a:t>5/19/2017</a:t>
             </a:fld>
             <a:endParaRPr lang="en-US" dirty="0"/>
           </a:p>
@@ -2166,7 +2166,7 @@
           <a:p>
             <a:fld id="{7C0CDFA7-EDC4-D143-82CE-05385A3E0AF5}" type="datetime1">
               <a:rPr lang="en-US" smtClean="0"/>
-              <a:t>5/13/17</a:t>
+              <a:t>5/19/2017</a:t>
             </a:fld>
             <a:endParaRPr lang="en-US" dirty="0"/>
           </a:p>
@@ -2416,7 +2416,7 @@
           <a:p>
             <a:fld id="{12AB45D1-C6D9-0C46-8F87-F6951924F865}" type="datetime1">
               <a:rPr lang="en-US" smtClean="0"/>
-              <a:t>5/13/17</a:t>
+              <a:t>5/19/2017</a:t>
             </a:fld>
             <a:endParaRPr lang="en-US" dirty="0"/>
           </a:p>
@@ -2652,7 +2652,7 @@
           <a:p>
             <a:fld id="{1FB92F97-7D08-8E4D-972D-EAF9FEBC8B10}" type="datetime1">
               <a:rPr lang="en-US" smtClean="0"/>
-              <a:t>5/13/17</a:t>
+              <a:t>5/19/2017</a:t>
             </a:fld>
             <a:endParaRPr lang="en-US" dirty="0"/>
           </a:p>
@@ -3023,7 +3023,7 @@
           <a:p>
             <a:fld id="{9840DCA4-E3E7-EA4B-B492-DA199C146E84}" type="datetime1">
               <a:rPr lang="en-US" smtClean="0"/>
-              <a:t>5/13/17</a:t>
+              <a:t>5/19/2017</a:t>
             </a:fld>
             <a:endParaRPr lang="en-US" dirty="0"/>
           </a:p>
@@ -3145,7 +3145,7 @@
           <a:p>
             <a:fld id="{7B8D5D14-44A7-434E-AD73-8B0BA9331EDB}" type="datetime1">
               <a:rPr lang="en-US" smtClean="0"/>
-              <a:t>5/13/17</a:t>
+              <a:t>5/19/2017</a:t>
             </a:fld>
             <a:endParaRPr lang="en-US" dirty="0"/>
           </a:p>
@@ -3244,7 +3244,7 @@
           <a:p>
             <a:fld id="{E031C98F-C463-2547-9371-137911505A70}" type="datetime1">
               <a:rPr lang="en-US" smtClean="0"/>
-              <a:t>5/13/17</a:t>
+              <a:t>5/19/2017</a:t>
             </a:fld>
             <a:endParaRPr lang="en-US" dirty="0"/>
           </a:p>
@@ -3525,7 +3525,7 @@
           <a:p>
             <a:fld id="{9B58218A-5514-2444-AED0-026585176DBD}" type="datetime1">
               <a:rPr lang="en-US" smtClean="0"/>
-              <a:t>5/13/17</a:t>
+              <a:t>5/19/2017</a:t>
             </a:fld>
             <a:endParaRPr lang="en-US" dirty="0"/>
           </a:p>
@@ -3709,7 +3709,7 @@
           <a:p>
             <a:fld id="{6761448D-496D-5548-8246-64A46FF197C2}" type="datetime1">
               <a:rPr lang="en-US" smtClean="0"/>
-              <a:t>5/13/17</a:t>
+              <a:t>5/19/2017</a:t>
             </a:fld>
             <a:endParaRPr lang="en-US" dirty="0"/>
           </a:p>
@@ -3985,7 +3985,7 @@
           <a:p>
             <a:fld id="{78D6C769-3809-FC48-8F6F-5F54DD3DC05A}" type="datetime1">
               <a:rPr lang="en-US" smtClean="0"/>
-              <a:t>5/13/17</a:t>
+              <a:t>5/19/2017</a:t>
             </a:fld>
             <a:endParaRPr lang="en-US" dirty="0"/>
           </a:p>
@@ -4159,7 +4159,7 @@
           <a:p>
             <a:fld id="{CF5661F0-4DE6-CC46-8C04-C8500CDB9DBD}" type="datetime1">
               <a:rPr lang="en-US" smtClean="0"/>
-              <a:t>5/13/17</a:t>
+              <a:t>5/19/2017</a:t>
             </a:fld>
             <a:endParaRPr lang="en-US" dirty="0"/>
           </a:p>
@@ -4343,7 +4343,7 @@
           <a:p>
             <a:fld id="{0E7DB3BD-0F25-2E47-9839-FA089C879C0C}" type="datetime1">
               <a:rPr lang="en-US" smtClean="0"/>
-              <a:t>5/13/17</a:t>
+              <a:t>5/19/2017</a:t>
             </a:fld>
             <a:endParaRPr lang="en-US" dirty="0"/>
           </a:p>
@@ -4601,7 +4601,7 @@
           <a:p>
             <a:fld id="{96EF3D46-E248-2549-9B34-051685171497}" type="datetime1">
               <a:rPr lang="en-US" smtClean="0"/>
-              <a:t>5/13/17</a:t>
+              <a:t>5/19/2017</a:t>
             </a:fld>
             <a:endParaRPr lang="en-US" dirty="0"/>
           </a:p>
@@ -4906,7 +4906,7 @@
           <a:p>
             <a:fld id="{8FF8717E-E43E-D244-9372-C70EFB495CB0}" type="datetime1">
               <a:rPr lang="en-US" smtClean="0"/>
-              <a:t>5/13/17</a:t>
+              <a:t>5/19/2017</a:t>
             </a:fld>
             <a:endParaRPr lang="en-US" dirty="0"/>
           </a:p>
@@ -5369,7 +5369,7 @@
           <a:p>
             <a:fld id="{FA9C6F01-0C4A-464A-9376-878FC3221BD0}" type="datetime1">
               <a:rPr lang="en-US" smtClean="0"/>
-              <a:t>5/13/17</a:t>
+              <a:t>5/19/2017</a:t>
             </a:fld>
             <a:endParaRPr lang="en-US" dirty="0"/>
           </a:p>
@@ -5506,7 +5506,7 @@
           <a:p>
             <a:fld id="{21B681D5-2997-CC49-BC74-02D0CAE42D00}" type="datetime1">
               <a:rPr lang="en-US" smtClean="0"/>
-              <a:t>5/13/17</a:t>
+              <a:t>5/19/2017</a:t>
             </a:fld>
             <a:endParaRPr lang="en-US" dirty="0"/>
           </a:p>
@@ -5620,7 +5620,7 @@
           <a:p>
             <a:fld id="{04A8B807-1523-294B-9B93-B4290C5E9676}" type="datetime1">
               <a:rPr lang="en-US" smtClean="0"/>
-              <a:t>5/13/17</a:t>
+              <a:t>5/19/2017</a:t>
             </a:fld>
             <a:endParaRPr lang="en-US" dirty="0"/>
           </a:p>
@@ -5879,7 +5879,7 @@
           <a:p>
             <a:fld id="{BF7C106E-35D5-CD47-9B3A-11E3ED20D057}" type="datetime1">
               <a:rPr lang="en-US" smtClean="0"/>
-              <a:t>5/13/17</a:t>
+              <a:t>5/19/2017</a:t>
             </a:fld>
             <a:endParaRPr lang="en-US" dirty="0"/>
           </a:p>
@@ -6190,7 +6190,7 @@
           <a:p>
             <a:fld id="{757826F5-E986-FF4D-9B41-D20683576EE0}" type="datetime1">
               <a:rPr lang="en-US" smtClean="0"/>
-              <a:t>5/13/17</a:t>
+              <a:t>5/19/2017</a:t>
             </a:fld>
             <a:endParaRPr lang="en-US" dirty="0"/>
           </a:p>
@@ -6501,7 +6501,7 @@
           <a:p>
             <a:fld id="{6FE7BD7A-ED5B-B841-AD60-7556EF0F06B5}" type="datetime1">
               <a:rPr lang="en-US" smtClean="0"/>
-              <a:t>5/13/17</a:t>
+              <a:t>5/19/2017</a:t>
             </a:fld>
             <a:endParaRPr lang="en-US" dirty="0"/>
           </a:p>
@@ -7266,7 +7266,7 @@
           <a:p>
             <a:fld id="{12B6F478-6DC6-8C42-A8EF-0BAFD164B9C2}" type="datetime1">
               <a:rPr lang="en-US" smtClean="0"/>
-              <a:t>5/13/17</a:t>
+              <a:t>5/19/2017</a:t>
             </a:fld>
             <a:endParaRPr lang="en-US" dirty="0"/>
           </a:p>
@@ -7718,7 +7718,7 @@
         </p:nvSpPr>
         <p:spPr>
           <a:xfrm>
-            <a:off x="377446" y="5897641"/>
+            <a:off x="502903" y="4997616"/>
             <a:ext cx="8368142" cy="743617"/>
           </a:xfrm>
         </p:spPr>
@@ -7756,7 +7756,7 @@
         </p:blipFill>
         <p:spPr>
           <a:xfrm>
-            <a:off x="3711109" y="4658224"/>
+            <a:off x="6430145" y="3998783"/>
             <a:ext cx="1700816" cy="1056435"/>
           </a:xfrm>
           <a:prstGeom prst="rect">
@@ -7764,6 +7764,66 @@
           </a:prstGeom>
         </p:spPr>
       </p:pic>
+      <p:pic>
+        <p:nvPicPr>
+          <p:cNvPr id="5" name="Εικόνα 4"/>
+          <p:cNvPicPr>
+            <a:picLocks noChangeAspect="1"/>
+          </p:cNvPicPr>
+          <p:nvPr/>
+        </p:nvPicPr>
+        <p:blipFill>
+          <a:blip r:embed="rId4">
+            <a:extLst>
+              <a:ext uri="{28A0092B-C50C-407E-A947-70E740481C1C}">
+                <a14:useLocalDpi xmlns:a14="http://schemas.microsoft.com/office/drawing/2010/main" val="0"/>
+              </a:ext>
+            </a:extLst>
+          </a:blip>
+          <a:stretch>
+            <a:fillRect/>
+          </a:stretch>
+        </p:blipFill>
+        <p:spPr>
+          <a:xfrm>
+            <a:off x="6038607" y="5443035"/>
+            <a:ext cx="2483892" cy="1214849"/>
+          </a:xfrm>
+          <a:prstGeom prst="rect">
+            <a:avLst/>
+          </a:prstGeom>
+        </p:spPr>
+      </p:pic>
+      <p:sp>
+        <p:nvSpPr>
+          <p:cNvPr id="6" name="TextBox 5"/>
+          <p:cNvSpPr txBox="1"/>
+          <p:nvPr/>
+        </p:nvSpPr>
+        <p:spPr>
+          <a:xfrm>
+            <a:off x="588095" y="5830226"/>
+            <a:ext cx="5101966" cy="369332"/>
+          </a:xfrm>
+          <a:prstGeom prst="rect">
+            <a:avLst/>
+          </a:prstGeom>
+          <a:noFill/>
+        </p:spPr>
+        <p:txBody>
+          <a:bodyPr wrap="square" rtlCol="0">
+            <a:spAutoFit/>
+          </a:bodyPr>
+          <a:lstStyle/>
+          <a:p>
+            <a:r>
+              <a:rPr lang="el-GR" b="1" dirty="0" smtClean="0"/>
+              <a:t>Μετάφραση: Φαρμάκης Θρασύβουλος</a:t>
+            </a:r>
+            <a:endParaRPr lang="el-GR" b="1" dirty="0"/>
+          </a:p>
+        </p:txBody>
+      </p:sp>
     </p:spTree>
     <p:extLst>
       <p:ext uri="{BB962C8B-B14F-4D97-AF65-F5344CB8AC3E}">
@@ -8245,7 +8305,7 @@
           <a:noFill/>
           <a:extLst>
             <a:ext uri="{909E8E84-426E-40dd-AFC4-6F175D3DCCD1}">
-              <a14:hiddenFill xmlns="" xmlns:a14="http://schemas.microsoft.com/office/drawing/2010/main">
+              <a14:hiddenFill xmlns:a14="http://schemas.microsoft.com/office/drawing/2010/main" xmlns="">
                 <a:solidFill>
                   <a:srgbClr val="FFFFFF"/>
                 </a:solidFill>
@@ -9094,12 +9154,33 @@
         </p:nvSpPr>
         <p:spPr/>
         <p:txBody>
-          <a:bodyPr/>
-          <a:lstStyle/>
-          <a:p>
+          <a:bodyPr>
+            <a:normAutofit fontScale="90000"/>
+          </a:bodyPr>
+          <a:lstStyle/>
+          <a:p>
+            <a:r>
+              <a:rPr lang="el-GR" dirty="0" smtClean="0"/>
+              <a:t>Ακόμα μια επιλογή της εντολής κινητήρα </a:t>
+            </a:r>
             <a:r>
               <a:rPr lang="en-US" dirty="0" smtClean="0"/>
-              <a:t>ANOTHER MOVE STEERING TIP: COAST or Brake?</a:t>
+              <a:t>: </a:t>
+            </a:r>
+            <a:r>
+              <a:rPr lang="el-GR" dirty="0" smtClean="0"/>
+              <a:t/>
+            </a:r>
+            <a:br>
+              <a:rPr lang="el-GR" dirty="0" smtClean="0"/>
+            </a:br>
+            <a:r>
+              <a:rPr lang="el-GR" dirty="0" smtClean="0"/>
+              <a:t>Κίνηση η φρένο</a:t>
+            </a:r>
+            <a:r>
+              <a:rPr lang="en-US" dirty="0" smtClean="0"/>
+              <a:t>?</a:t>
             </a:r>
             <a:endParaRPr lang="en-US" dirty="0"/>
           </a:p>
@@ -9130,8 +9211,12 @@
               <a:buChar char="•"/>
             </a:pPr>
             <a:r>
+              <a:rPr lang="el-GR" b="0" dirty="0" smtClean="0"/>
+              <a:t>Πρόσθετη επιλογή της εντολής κινητήρα </a:t>
+            </a:r>
+            <a:r>
               <a:rPr lang="en-US" b="0" dirty="0" smtClean="0"/>
-              <a:t>Something more about the Move Steering Block</a:t>
+              <a:t>Move Steering Block</a:t>
             </a:r>
           </a:p>
           <a:p>
@@ -9140,8 +9225,20 @@
               <a:buChar char="•"/>
             </a:pPr>
             <a:r>
+              <a:rPr lang="el-GR" b="0" dirty="0" smtClean="0"/>
+              <a:t>Θα παρατηρήσετε πως υπάρχει η επιλογή κίνησης(</a:t>
+            </a:r>
+            <a:r>
               <a:rPr lang="en-US" b="0" dirty="0" smtClean="0"/>
-              <a:t>You will notice you have an option to COAST or BRAKE</a:t>
+              <a:t>coast) </a:t>
+            </a:r>
+            <a:r>
+              <a:rPr lang="el-GR" b="0" dirty="0" smtClean="0"/>
+              <a:t>και φρένο (</a:t>
+            </a:r>
+            <a:r>
+              <a:rPr lang="en-US" b="0" dirty="0" smtClean="0"/>
+              <a:t>brake)</a:t>
             </a:r>
           </a:p>
           <a:p>
@@ -9150,22 +9247,21 @@
               <a:buChar char="•"/>
             </a:pPr>
             <a:r>
+              <a:rPr lang="el-GR" b="0" dirty="0" smtClean="0"/>
+              <a:t>Η κίνηση θα κάνει τον κινητήρα σας να συνεχίζει να κινείται</a:t>
+            </a:r>
+            <a:r>
               <a:rPr lang="en-US" b="0" dirty="0" smtClean="0"/>
-              <a:t>Coast </a:t>
-            </a:r>
-            <a:r>
-              <a:rPr lang="en-US" b="0" dirty="0"/>
-              <a:t>will make the motors keep moving.  </a:t>
+              <a:t>.</a:t>
+            </a:r>
+            <a:r>
+              <a:rPr lang="el-GR" b="0" dirty="0" smtClean="0"/>
+              <a:t> Το φρένο θα σταματήσει τον κινητήρα σας ακαριαία</a:t>
             </a:r>
             <a:r>
               <a:rPr lang="en-US" b="0" dirty="0" smtClean="0"/>
-              <a:t>Brake makes </a:t>
-            </a:r>
-            <a:r>
-              <a:rPr lang="en-US" b="0" dirty="0"/>
-              <a:t>the motors stop immediately. </a:t>
-            </a:r>
-            <a:endParaRPr lang="en-US" b="0" dirty="0" smtClean="0"/>
+              <a:t>. </a:t>
+            </a:r>
           </a:p>
           <a:p>
             <a:pPr marL="342900" indent="-342900">
@@ -11396,7 +11492,7 @@
           <a:effectLst/>
           <a:extLst>
             <a:ext uri="{91240B29-F687-4f45-9708-019B960494DF}">
-              <a14:hiddenLine xmlns:a14="http://schemas.microsoft.com/office/drawing/2010/main" xmlns="" w="9525">
+              <a14:hiddenLine xmlns="" xmlns:a14="http://schemas.microsoft.com/office/drawing/2010/main" w="9525">
                 <a:solidFill>
                   <a:schemeClr val="tx1"/>
                 </a:solidFill>
@@ -11406,7 +11502,7 @@
               </a14:hiddenLine>
             </a:ext>
             <a:ext uri="{AF507438-7753-43e0-B8FC-AC1667EBCBE1}">
-              <a14:hiddenEffects xmlns:a14="http://schemas.microsoft.com/office/drawing/2010/main" xmlns="">
+              <a14:hiddenEffects xmlns="" xmlns:a14="http://schemas.microsoft.com/office/drawing/2010/main">
                 <a:effectLst>
                   <a:outerShdw dist="35921" dir="2700000" algn="ctr" rotWithShape="0">
                     <a:schemeClr val="bg2"/>
@@ -11703,7 +11799,7 @@
           <a:noFill/>
           <a:extLst>
             <a:ext uri="{909E8E84-426E-40dd-AFC4-6F175D3DCCD1}">
-              <a14:hiddenFill xmlns:a14="http://schemas.microsoft.com/office/drawing/2010/main" xmlns="">
+              <a14:hiddenFill xmlns="" xmlns:a14="http://schemas.microsoft.com/office/drawing/2010/main">
                 <a:solidFill>
                   <a:srgbClr val="FFFFFF"/>
                 </a:solidFill>

</xml_diff>